<commit_message>
Big catch up - added variability (CV, PV, V2, Gini) and bootstraps
</commit_message>
<xml_diff>
--- a/Ab_sus_pred_fig.pptx
+++ b/Ab_sus_pred_fig.pptx
@@ -2,12 +2,13 @@
 <file path=ppt/presentation.xml><?xml version="1.0" encoding="utf-8"?>
 <p:presentation xmlns:a="http://schemas.openxmlformats.org/drawingml/2006/main" xmlns:r="http://schemas.openxmlformats.org/officeDocument/2006/relationships" xmlns:p="http://schemas.openxmlformats.org/presentationml/2006/main" saveSubsetFonts="1" autoCompressPictures="0">
   <p:sldMasterIdLst>
-    <p:sldMasterId id="2147483672" r:id="rId1"/>
+    <p:sldMasterId id="2147483684" r:id="rId1"/>
   </p:sldMasterIdLst>
   <p:sldIdLst>
     <p:sldId id="256" r:id="rId2"/>
+    <p:sldId id="257" r:id="rId3"/>
   </p:sldIdLst>
-  <p:sldSz cx="17830800" cy="3657600"/>
+  <p:sldSz cx="5943600" cy="10972800"/>
   <p:notesSz cx="6858000" cy="9144000"/>
   <p:defaultTextStyle>
     <a:defPPr>
@@ -104,6 +105,11 @@
       </a:defRPr>
     </a:lvl9pPr>
   </p:defaultTextStyle>
+  <p:extLst>
+    <p:ext uri="{EFAFB233-063F-42B5-8137-9DF3F51BA10A}">
+      <p15:sldGuideLst xmlns:p15="http://schemas.microsoft.com/office/powerpoint/2012/main"/>
+    </p:ext>
+  </p:extLst>
 </p:presentation>
 </file>
 
@@ -136,15 +142,15 @@
         </p:nvSpPr>
         <p:spPr>
           <a:xfrm>
-            <a:off x="2228850" y="598593"/>
-            <a:ext cx="13373100" cy="1273387"/>
+            <a:off x="445770" y="1795781"/>
+            <a:ext cx="5052060" cy="3820160"/>
           </a:xfrm>
         </p:spPr>
         <p:txBody>
           <a:bodyPr anchor="b"/>
           <a:lstStyle>
             <a:lvl1pPr algn="ctr">
-              <a:defRPr sz="3200"/>
+              <a:defRPr sz="3900"/>
             </a:lvl1pPr>
           </a:lstStyle>
           <a:p>
@@ -168,8 +174,8 @@
         </p:nvSpPr>
         <p:spPr>
           <a:xfrm>
-            <a:off x="2228850" y="1921087"/>
-            <a:ext cx="13373100" cy="883073"/>
+            <a:off x="742950" y="5763261"/>
+            <a:ext cx="4457700" cy="2649219"/>
           </a:xfrm>
         </p:spPr>
         <p:txBody>
@@ -177,39 +183,39 @@
           <a:lstStyle>
             <a:lvl1pPr marL="0" indent="0" algn="ctr">
               <a:buNone/>
-              <a:defRPr sz="1280"/>
+              <a:defRPr sz="1560"/>
             </a:lvl1pPr>
-            <a:lvl2pPr marL="243825" indent="0" algn="ctr">
-              <a:buNone/>
-              <a:defRPr sz="1067"/>
+            <a:lvl2pPr marL="297180" indent="0" algn="ctr">
+              <a:buNone/>
+              <a:defRPr sz="1300"/>
             </a:lvl2pPr>
-            <a:lvl3pPr marL="487650" indent="0" algn="ctr">
-              <a:buNone/>
-              <a:defRPr sz="960"/>
+            <a:lvl3pPr marL="594360" indent="0" algn="ctr">
+              <a:buNone/>
+              <a:defRPr sz="1170"/>
             </a:lvl3pPr>
-            <a:lvl4pPr marL="731474" indent="0" algn="ctr">
-              <a:buNone/>
-              <a:defRPr sz="853"/>
+            <a:lvl4pPr marL="891540" indent="0" algn="ctr">
+              <a:buNone/>
+              <a:defRPr sz="1040"/>
             </a:lvl4pPr>
-            <a:lvl5pPr marL="975299" indent="0" algn="ctr">
-              <a:buNone/>
-              <a:defRPr sz="853"/>
+            <a:lvl5pPr marL="1188720" indent="0" algn="ctr">
+              <a:buNone/>
+              <a:defRPr sz="1040"/>
             </a:lvl5pPr>
-            <a:lvl6pPr marL="1219124" indent="0" algn="ctr">
-              <a:buNone/>
-              <a:defRPr sz="853"/>
+            <a:lvl6pPr marL="1485900" indent="0" algn="ctr">
+              <a:buNone/>
+              <a:defRPr sz="1040"/>
             </a:lvl6pPr>
-            <a:lvl7pPr marL="1462949" indent="0" algn="ctr">
-              <a:buNone/>
-              <a:defRPr sz="853"/>
+            <a:lvl7pPr marL="1783080" indent="0" algn="ctr">
+              <a:buNone/>
+              <a:defRPr sz="1040"/>
             </a:lvl7pPr>
-            <a:lvl8pPr marL="1706773" indent="0" algn="ctr">
-              <a:buNone/>
-              <a:defRPr sz="853"/>
+            <a:lvl8pPr marL="2080260" indent="0" algn="ctr">
+              <a:buNone/>
+              <a:defRPr sz="1040"/>
             </a:lvl8pPr>
-            <a:lvl9pPr marL="1950598" indent="0" algn="ctr">
-              <a:buNone/>
-              <a:defRPr sz="853"/>
+            <a:lvl9pPr marL="2377440" indent="0" algn="ctr">
+              <a:buNone/>
+              <a:defRPr sz="1040"/>
             </a:lvl9pPr>
           </a:lstStyle>
           <a:p>
@@ -238,7 +244,7 @@
           <a:p>
             <a:fld id="{84FE989D-8549-964F-B2BC-61F9DCA90181}" type="datetimeFigureOut">
               <a:rPr lang="en-US" smtClean="0"/>
-              <a:t>4/25/24</a:t>
+              <a:t>4/26/24</a:t>
             </a:fld>
             <a:endParaRPr lang="en-US"/>
           </a:p>
@@ -289,7 +295,7 @@
     </p:spTree>
     <p:extLst>
       <p:ext uri="{BB962C8B-B14F-4D97-AF65-F5344CB8AC3E}">
-        <p14:creationId xmlns:p14="http://schemas.microsoft.com/office/powerpoint/2010/main" val="3014021003"/>
+        <p14:creationId xmlns:p14="http://schemas.microsoft.com/office/powerpoint/2010/main" val="3475419421"/>
       </p:ext>
     </p:extLst>
   </p:cSld>
@@ -408,7 +414,7 @@
           <a:p>
             <a:fld id="{84FE989D-8549-964F-B2BC-61F9DCA90181}" type="datetimeFigureOut">
               <a:rPr lang="en-US" smtClean="0"/>
-              <a:t>4/25/24</a:t>
+              <a:t>4/26/24</a:t>
             </a:fld>
             <a:endParaRPr lang="en-US"/>
           </a:p>
@@ -459,7 +465,7 @@
     </p:spTree>
     <p:extLst>
       <p:ext uri="{BB962C8B-B14F-4D97-AF65-F5344CB8AC3E}">
-        <p14:creationId xmlns:p14="http://schemas.microsoft.com/office/powerpoint/2010/main" val="1253156842"/>
+        <p14:creationId xmlns:p14="http://schemas.microsoft.com/office/powerpoint/2010/main" val="908309807"/>
       </p:ext>
     </p:extLst>
   </p:cSld>
@@ -498,8 +504,8 @@
         </p:nvSpPr>
         <p:spPr>
           <a:xfrm>
-            <a:off x="12760166" y="194733"/>
-            <a:ext cx="3844766" cy="3099647"/>
+            <a:off x="4253389" y="584200"/>
+            <a:ext cx="1281589" cy="9298941"/>
           </a:xfrm>
         </p:spPr>
         <p:txBody>
@@ -526,8 +532,8 @@
         </p:nvSpPr>
         <p:spPr>
           <a:xfrm>
-            <a:off x="1225867" y="194733"/>
-            <a:ext cx="11311414" cy="3099647"/>
+            <a:off x="408623" y="584200"/>
+            <a:ext cx="3770471" cy="9298941"/>
           </a:xfrm>
         </p:spPr>
         <p:txBody>
@@ -588,7 +594,7 @@
           <a:p>
             <a:fld id="{84FE989D-8549-964F-B2BC-61F9DCA90181}" type="datetimeFigureOut">
               <a:rPr lang="en-US" smtClean="0"/>
-              <a:t>4/25/24</a:t>
+              <a:t>4/26/24</a:t>
             </a:fld>
             <a:endParaRPr lang="en-US"/>
           </a:p>
@@ -639,7 +645,7 @@
     </p:spTree>
     <p:extLst>
       <p:ext uri="{BB962C8B-B14F-4D97-AF65-F5344CB8AC3E}">
-        <p14:creationId xmlns:p14="http://schemas.microsoft.com/office/powerpoint/2010/main" val="46561810"/>
+        <p14:creationId xmlns:p14="http://schemas.microsoft.com/office/powerpoint/2010/main" val="1096466579"/>
       </p:ext>
     </p:extLst>
   </p:cSld>
@@ -758,7 +764,7 @@
           <a:p>
             <a:fld id="{84FE989D-8549-964F-B2BC-61F9DCA90181}" type="datetimeFigureOut">
               <a:rPr lang="en-US" smtClean="0"/>
-              <a:t>4/25/24</a:t>
+              <a:t>4/26/24</a:t>
             </a:fld>
             <a:endParaRPr lang="en-US"/>
           </a:p>
@@ -809,7 +815,7 @@
     </p:spTree>
     <p:extLst>
       <p:ext uri="{BB962C8B-B14F-4D97-AF65-F5344CB8AC3E}">
-        <p14:creationId xmlns:p14="http://schemas.microsoft.com/office/powerpoint/2010/main" val="618237237"/>
+        <p14:creationId xmlns:p14="http://schemas.microsoft.com/office/powerpoint/2010/main" val="831656611"/>
       </p:ext>
     </p:extLst>
   </p:cSld>
@@ -848,15 +854,15 @@
         </p:nvSpPr>
         <p:spPr>
           <a:xfrm>
-            <a:off x="1216581" y="911860"/>
-            <a:ext cx="15379065" cy="1521460"/>
+            <a:off x="405527" y="2735583"/>
+            <a:ext cx="5126355" cy="4564379"/>
           </a:xfrm>
         </p:spPr>
         <p:txBody>
           <a:bodyPr anchor="b"/>
           <a:lstStyle>
             <a:lvl1pPr>
-              <a:defRPr sz="3200"/>
+              <a:defRPr sz="3900"/>
             </a:lvl1pPr>
           </a:lstStyle>
           <a:p>
@@ -880,8 +886,8 @@
         </p:nvSpPr>
         <p:spPr>
           <a:xfrm>
-            <a:off x="1216581" y="2447714"/>
-            <a:ext cx="15379065" cy="800100"/>
+            <a:off x="405527" y="7343143"/>
+            <a:ext cx="5126355" cy="2400299"/>
           </a:xfrm>
         </p:spPr>
         <p:txBody>
@@ -889,7 +895,7 @@
           <a:lstStyle>
             <a:lvl1pPr marL="0" indent="0">
               <a:buNone/>
-              <a:defRPr sz="1280">
+              <a:defRPr sz="1560">
                 <a:solidFill>
                   <a:schemeClr val="tx1">
                     <a:tint val="82000"/>
@@ -897,9 +903,9 @@
                 </a:solidFill>
               </a:defRPr>
             </a:lvl1pPr>
-            <a:lvl2pPr marL="243825" indent="0">
-              <a:buNone/>
-              <a:defRPr sz="1067">
+            <a:lvl2pPr marL="297180" indent="0">
+              <a:buNone/>
+              <a:defRPr sz="1300">
                 <a:solidFill>
                   <a:schemeClr val="tx1">
                     <a:tint val="82000"/>
@@ -907,9 +913,9 @@
                 </a:solidFill>
               </a:defRPr>
             </a:lvl2pPr>
-            <a:lvl3pPr marL="487650" indent="0">
-              <a:buNone/>
-              <a:defRPr sz="960">
+            <a:lvl3pPr marL="594360" indent="0">
+              <a:buNone/>
+              <a:defRPr sz="1170">
                 <a:solidFill>
                   <a:schemeClr val="tx1">
                     <a:tint val="82000"/>
@@ -917,9 +923,9 @@
                 </a:solidFill>
               </a:defRPr>
             </a:lvl3pPr>
-            <a:lvl4pPr marL="731474" indent="0">
-              <a:buNone/>
-              <a:defRPr sz="853">
+            <a:lvl4pPr marL="891540" indent="0">
+              <a:buNone/>
+              <a:defRPr sz="1040">
                 <a:solidFill>
                   <a:schemeClr val="tx1">
                     <a:tint val="82000"/>
@@ -927,9 +933,9 @@
                 </a:solidFill>
               </a:defRPr>
             </a:lvl4pPr>
-            <a:lvl5pPr marL="975299" indent="0">
-              <a:buNone/>
-              <a:defRPr sz="853">
+            <a:lvl5pPr marL="1188720" indent="0">
+              <a:buNone/>
+              <a:defRPr sz="1040">
                 <a:solidFill>
                   <a:schemeClr val="tx1">
                     <a:tint val="82000"/>
@@ -937,9 +943,9 @@
                 </a:solidFill>
               </a:defRPr>
             </a:lvl5pPr>
-            <a:lvl6pPr marL="1219124" indent="0">
-              <a:buNone/>
-              <a:defRPr sz="853">
+            <a:lvl6pPr marL="1485900" indent="0">
+              <a:buNone/>
+              <a:defRPr sz="1040">
                 <a:solidFill>
                   <a:schemeClr val="tx1">
                     <a:tint val="82000"/>
@@ -947,9 +953,9 @@
                 </a:solidFill>
               </a:defRPr>
             </a:lvl6pPr>
-            <a:lvl7pPr marL="1462949" indent="0">
-              <a:buNone/>
-              <a:defRPr sz="853">
+            <a:lvl7pPr marL="1783080" indent="0">
+              <a:buNone/>
+              <a:defRPr sz="1040">
                 <a:solidFill>
                   <a:schemeClr val="tx1">
                     <a:tint val="82000"/>
@@ -957,9 +963,9 @@
                 </a:solidFill>
               </a:defRPr>
             </a:lvl7pPr>
-            <a:lvl8pPr marL="1706773" indent="0">
-              <a:buNone/>
-              <a:defRPr sz="853">
+            <a:lvl8pPr marL="2080260" indent="0">
+              <a:buNone/>
+              <a:defRPr sz="1040">
                 <a:solidFill>
                   <a:schemeClr val="tx1">
                     <a:tint val="82000"/>
@@ -967,9 +973,9 @@
                 </a:solidFill>
               </a:defRPr>
             </a:lvl8pPr>
-            <a:lvl9pPr marL="1950598" indent="0">
-              <a:buNone/>
-              <a:defRPr sz="853">
+            <a:lvl9pPr marL="2377440" indent="0">
+              <a:buNone/>
+              <a:defRPr sz="1040">
                 <a:solidFill>
                   <a:schemeClr val="tx1">
                     <a:tint val="82000"/>
@@ -1004,7 +1010,7 @@
           <a:p>
             <a:fld id="{84FE989D-8549-964F-B2BC-61F9DCA90181}" type="datetimeFigureOut">
               <a:rPr lang="en-US" smtClean="0"/>
-              <a:t>4/25/24</a:t>
+              <a:t>4/26/24</a:t>
             </a:fld>
             <a:endParaRPr lang="en-US"/>
           </a:p>
@@ -1055,7 +1061,7 @@
     </p:spTree>
     <p:extLst>
       <p:ext uri="{BB962C8B-B14F-4D97-AF65-F5344CB8AC3E}">
-        <p14:creationId xmlns:p14="http://schemas.microsoft.com/office/powerpoint/2010/main" val="1207522739"/>
+        <p14:creationId xmlns:p14="http://schemas.microsoft.com/office/powerpoint/2010/main" val="799033111"/>
       </p:ext>
     </p:extLst>
   </p:cSld>
@@ -1117,8 +1123,8 @@
         </p:nvSpPr>
         <p:spPr>
           <a:xfrm>
-            <a:off x="1225868" y="973666"/>
-            <a:ext cx="7578090" cy="2320714"/>
+            <a:off x="408623" y="2921000"/>
+            <a:ext cx="2526030" cy="6962141"/>
           </a:xfrm>
         </p:spPr>
         <p:txBody>
@@ -1174,8 +1180,8 @@
         </p:nvSpPr>
         <p:spPr>
           <a:xfrm>
-            <a:off x="9026843" y="973666"/>
-            <a:ext cx="7578090" cy="2320714"/>
+            <a:off x="3008948" y="2921000"/>
+            <a:ext cx="2526030" cy="6962141"/>
           </a:xfrm>
         </p:spPr>
         <p:txBody>
@@ -1236,7 +1242,7 @@
           <a:p>
             <a:fld id="{84FE989D-8549-964F-B2BC-61F9DCA90181}" type="datetimeFigureOut">
               <a:rPr lang="en-US" smtClean="0"/>
-              <a:t>4/25/24</a:t>
+              <a:t>4/26/24</a:t>
             </a:fld>
             <a:endParaRPr lang="en-US"/>
           </a:p>
@@ -1287,7 +1293,7 @@
     </p:spTree>
     <p:extLst>
       <p:ext uri="{BB962C8B-B14F-4D97-AF65-F5344CB8AC3E}">
-        <p14:creationId xmlns:p14="http://schemas.microsoft.com/office/powerpoint/2010/main" val="1767934456"/>
+        <p14:creationId xmlns:p14="http://schemas.microsoft.com/office/powerpoint/2010/main" val="1226040946"/>
       </p:ext>
     </p:extLst>
   </p:cSld>
@@ -1326,8 +1332,8 @@
         </p:nvSpPr>
         <p:spPr>
           <a:xfrm>
-            <a:off x="1228190" y="194734"/>
-            <a:ext cx="15379065" cy="706967"/>
+            <a:off x="409397" y="584202"/>
+            <a:ext cx="5126355" cy="2120901"/>
           </a:xfrm>
         </p:spPr>
         <p:txBody>
@@ -1354,8 +1360,8 @@
         </p:nvSpPr>
         <p:spPr>
           <a:xfrm>
-            <a:off x="1228191" y="896620"/>
-            <a:ext cx="7543263" cy="439420"/>
+            <a:off x="409397" y="2689861"/>
+            <a:ext cx="2514421" cy="1318259"/>
           </a:xfrm>
         </p:spPr>
         <p:txBody>
@@ -1363,39 +1369,39 @@
           <a:lstStyle>
             <a:lvl1pPr marL="0" indent="0">
               <a:buNone/>
-              <a:defRPr sz="1280" b="1"/>
+              <a:defRPr sz="1560" b="1"/>
             </a:lvl1pPr>
-            <a:lvl2pPr marL="243825" indent="0">
-              <a:buNone/>
-              <a:defRPr sz="1067" b="1"/>
+            <a:lvl2pPr marL="297180" indent="0">
+              <a:buNone/>
+              <a:defRPr sz="1300" b="1"/>
             </a:lvl2pPr>
-            <a:lvl3pPr marL="487650" indent="0">
-              <a:buNone/>
-              <a:defRPr sz="960" b="1"/>
+            <a:lvl3pPr marL="594360" indent="0">
+              <a:buNone/>
+              <a:defRPr sz="1170" b="1"/>
             </a:lvl3pPr>
-            <a:lvl4pPr marL="731474" indent="0">
-              <a:buNone/>
-              <a:defRPr sz="853" b="1"/>
+            <a:lvl4pPr marL="891540" indent="0">
+              <a:buNone/>
+              <a:defRPr sz="1040" b="1"/>
             </a:lvl4pPr>
-            <a:lvl5pPr marL="975299" indent="0">
-              <a:buNone/>
-              <a:defRPr sz="853" b="1"/>
+            <a:lvl5pPr marL="1188720" indent="0">
+              <a:buNone/>
+              <a:defRPr sz="1040" b="1"/>
             </a:lvl5pPr>
-            <a:lvl6pPr marL="1219124" indent="0">
-              <a:buNone/>
-              <a:defRPr sz="853" b="1"/>
+            <a:lvl6pPr marL="1485900" indent="0">
+              <a:buNone/>
+              <a:defRPr sz="1040" b="1"/>
             </a:lvl6pPr>
-            <a:lvl7pPr marL="1462949" indent="0">
-              <a:buNone/>
-              <a:defRPr sz="853" b="1"/>
+            <a:lvl7pPr marL="1783080" indent="0">
+              <a:buNone/>
+              <a:defRPr sz="1040" b="1"/>
             </a:lvl7pPr>
-            <a:lvl8pPr marL="1706773" indent="0">
-              <a:buNone/>
-              <a:defRPr sz="853" b="1"/>
+            <a:lvl8pPr marL="2080260" indent="0">
+              <a:buNone/>
+              <a:defRPr sz="1040" b="1"/>
             </a:lvl8pPr>
-            <a:lvl9pPr marL="1950598" indent="0">
-              <a:buNone/>
-              <a:defRPr sz="853" b="1"/>
+            <a:lvl9pPr marL="2377440" indent="0">
+              <a:buNone/>
+              <a:defRPr sz="1040" b="1"/>
             </a:lvl9pPr>
           </a:lstStyle>
           <a:p>
@@ -1419,8 +1425,8 @@
         </p:nvSpPr>
         <p:spPr>
           <a:xfrm>
-            <a:off x="1228191" y="1336040"/>
-            <a:ext cx="7543263" cy="1965114"/>
+            <a:off x="409397" y="4008120"/>
+            <a:ext cx="2514421" cy="5895341"/>
           </a:xfrm>
         </p:spPr>
         <p:txBody>
@@ -1476,8 +1482,8 @@
         </p:nvSpPr>
         <p:spPr>
           <a:xfrm>
-            <a:off x="9026843" y="896620"/>
-            <a:ext cx="7580412" cy="439420"/>
+            <a:off x="3008948" y="2689861"/>
+            <a:ext cx="2526804" cy="1318259"/>
           </a:xfrm>
         </p:spPr>
         <p:txBody>
@@ -1485,39 +1491,39 @@
           <a:lstStyle>
             <a:lvl1pPr marL="0" indent="0">
               <a:buNone/>
-              <a:defRPr sz="1280" b="1"/>
+              <a:defRPr sz="1560" b="1"/>
             </a:lvl1pPr>
-            <a:lvl2pPr marL="243825" indent="0">
-              <a:buNone/>
-              <a:defRPr sz="1067" b="1"/>
+            <a:lvl2pPr marL="297180" indent="0">
+              <a:buNone/>
+              <a:defRPr sz="1300" b="1"/>
             </a:lvl2pPr>
-            <a:lvl3pPr marL="487650" indent="0">
-              <a:buNone/>
-              <a:defRPr sz="960" b="1"/>
+            <a:lvl3pPr marL="594360" indent="0">
+              <a:buNone/>
+              <a:defRPr sz="1170" b="1"/>
             </a:lvl3pPr>
-            <a:lvl4pPr marL="731474" indent="0">
-              <a:buNone/>
-              <a:defRPr sz="853" b="1"/>
+            <a:lvl4pPr marL="891540" indent="0">
+              <a:buNone/>
+              <a:defRPr sz="1040" b="1"/>
             </a:lvl4pPr>
-            <a:lvl5pPr marL="975299" indent="0">
-              <a:buNone/>
-              <a:defRPr sz="853" b="1"/>
+            <a:lvl5pPr marL="1188720" indent="0">
+              <a:buNone/>
+              <a:defRPr sz="1040" b="1"/>
             </a:lvl5pPr>
-            <a:lvl6pPr marL="1219124" indent="0">
-              <a:buNone/>
-              <a:defRPr sz="853" b="1"/>
+            <a:lvl6pPr marL="1485900" indent="0">
+              <a:buNone/>
+              <a:defRPr sz="1040" b="1"/>
             </a:lvl6pPr>
-            <a:lvl7pPr marL="1462949" indent="0">
-              <a:buNone/>
-              <a:defRPr sz="853" b="1"/>
+            <a:lvl7pPr marL="1783080" indent="0">
+              <a:buNone/>
+              <a:defRPr sz="1040" b="1"/>
             </a:lvl7pPr>
-            <a:lvl8pPr marL="1706773" indent="0">
-              <a:buNone/>
-              <a:defRPr sz="853" b="1"/>
+            <a:lvl8pPr marL="2080260" indent="0">
+              <a:buNone/>
+              <a:defRPr sz="1040" b="1"/>
             </a:lvl8pPr>
-            <a:lvl9pPr marL="1950598" indent="0">
-              <a:buNone/>
-              <a:defRPr sz="853" b="1"/>
+            <a:lvl9pPr marL="2377440" indent="0">
+              <a:buNone/>
+              <a:defRPr sz="1040" b="1"/>
             </a:lvl9pPr>
           </a:lstStyle>
           <a:p>
@@ -1541,8 +1547,8 @@
         </p:nvSpPr>
         <p:spPr>
           <a:xfrm>
-            <a:off x="9026843" y="1336040"/>
-            <a:ext cx="7580412" cy="1965114"/>
+            <a:off x="3008948" y="4008120"/>
+            <a:ext cx="2526804" cy="5895341"/>
           </a:xfrm>
         </p:spPr>
         <p:txBody>
@@ -1603,7 +1609,7 @@
           <a:p>
             <a:fld id="{84FE989D-8549-964F-B2BC-61F9DCA90181}" type="datetimeFigureOut">
               <a:rPr lang="en-US" smtClean="0"/>
-              <a:t>4/25/24</a:t>
+              <a:t>4/26/24</a:t>
             </a:fld>
             <a:endParaRPr lang="en-US"/>
           </a:p>
@@ -1654,7 +1660,7 @@
     </p:spTree>
     <p:extLst>
       <p:ext uri="{BB962C8B-B14F-4D97-AF65-F5344CB8AC3E}">
-        <p14:creationId xmlns:p14="http://schemas.microsoft.com/office/powerpoint/2010/main" val="1098793021"/>
+        <p14:creationId xmlns:p14="http://schemas.microsoft.com/office/powerpoint/2010/main" val="2863536776"/>
       </p:ext>
     </p:extLst>
   </p:cSld>
@@ -1721,7 +1727,7 @@
           <a:p>
             <a:fld id="{84FE989D-8549-964F-B2BC-61F9DCA90181}" type="datetimeFigureOut">
               <a:rPr lang="en-US" smtClean="0"/>
-              <a:t>4/25/24</a:t>
+              <a:t>4/26/24</a:t>
             </a:fld>
             <a:endParaRPr lang="en-US"/>
           </a:p>
@@ -1772,7 +1778,7 @@
     </p:spTree>
     <p:extLst>
       <p:ext uri="{BB962C8B-B14F-4D97-AF65-F5344CB8AC3E}">
-        <p14:creationId xmlns:p14="http://schemas.microsoft.com/office/powerpoint/2010/main" val="3714096458"/>
+        <p14:creationId xmlns:p14="http://schemas.microsoft.com/office/powerpoint/2010/main" val="2372893418"/>
       </p:ext>
     </p:extLst>
   </p:cSld>
@@ -1816,7 +1822,7 @@
           <a:p>
             <a:fld id="{84FE989D-8549-964F-B2BC-61F9DCA90181}" type="datetimeFigureOut">
               <a:rPr lang="en-US" smtClean="0"/>
-              <a:t>4/25/24</a:t>
+              <a:t>4/26/24</a:t>
             </a:fld>
             <a:endParaRPr lang="en-US"/>
           </a:p>
@@ -1867,7 +1873,7 @@
     </p:spTree>
     <p:extLst>
       <p:ext uri="{BB962C8B-B14F-4D97-AF65-F5344CB8AC3E}">
-        <p14:creationId xmlns:p14="http://schemas.microsoft.com/office/powerpoint/2010/main" val="2930878651"/>
+        <p14:creationId xmlns:p14="http://schemas.microsoft.com/office/powerpoint/2010/main" val="1596050454"/>
       </p:ext>
     </p:extLst>
   </p:cSld>
@@ -1906,15 +1912,15 @@
         </p:nvSpPr>
         <p:spPr>
           <a:xfrm>
-            <a:off x="1228190" y="243840"/>
-            <a:ext cx="5750897" cy="853440"/>
+            <a:off x="409397" y="731520"/>
+            <a:ext cx="1916966" cy="2560320"/>
           </a:xfrm>
         </p:spPr>
         <p:txBody>
           <a:bodyPr anchor="b"/>
           <a:lstStyle>
             <a:lvl1pPr>
-              <a:defRPr sz="1707"/>
+              <a:defRPr sz="2080"/>
             </a:lvl1pPr>
           </a:lstStyle>
           <a:p>
@@ -1938,39 +1944,39 @@
         </p:nvSpPr>
         <p:spPr>
           <a:xfrm>
-            <a:off x="7580412" y="526627"/>
-            <a:ext cx="9026843" cy="2599267"/>
+            <a:off x="2526804" y="1579882"/>
+            <a:ext cx="3008948" cy="7797800"/>
           </a:xfrm>
         </p:spPr>
         <p:txBody>
           <a:bodyPr/>
           <a:lstStyle>
             <a:lvl1pPr>
-              <a:defRPr sz="1707"/>
+              <a:defRPr sz="2080"/>
             </a:lvl1pPr>
             <a:lvl2pPr>
-              <a:defRPr sz="1493"/>
+              <a:defRPr sz="1820"/>
             </a:lvl2pPr>
             <a:lvl3pPr>
-              <a:defRPr sz="1280"/>
+              <a:defRPr sz="1560"/>
             </a:lvl3pPr>
             <a:lvl4pPr>
-              <a:defRPr sz="1067"/>
+              <a:defRPr sz="1300"/>
             </a:lvl4pPr>
             <a:lvl5pPr>
-              <a:defRPr sz="1067"/>
+              <a:defRPr sz="1300"/>
             </a:lvl5pPr>
             <a:lvl6pPr>
-              <a:defRPr sz="1067"/>
+              <a:defRPr sz="1300"/>
             </a:lvl6pPr>
             <a:lvl7pPr>
-              <a:defRPr sz="1067"/>
+              <a:defRPr sz="1300"/>
             </a:lvl7pPr>
             <a:lvl8pPr>
-              <a:defRPr sz="1067"/>
+              <a:defRPr sz="1300"/>
             </a:lvl8pPr>
             <a:lvl9pPr>
-              <a:defRPr sz="1067"/>
+              <a:defRPr sz="1300"/>
             </a:lvl9pPr>
           </a:lstStyle>
           <a:p>
@@ -2023,8 +2029,8 @@
         </p:nvSpPr>
         <p:spPr>
           <a:xfrm>
-            <a:off x="1228190" y="1097280"/>
-            <a:ext cx="5750897" cy="2032847"/>
+            <a:off x="409397" y="3291840"/>
+            <a:ext cx="1916966" cy="6098541"/>
           </a:xfrm>
         </p:spPr>
         <p:txBody>
@@ -2032,39 +2038,39 @@
           <a:lstStyle>
             <a:lvl1pPr marL="0" indent="0">
               <a:buNone/>
-              <a:defRPr sz="853"/>
+              <a:defRPr sz="1040"/>
             </a:lvl1pPr>
-            <a:lvl2pPr marL="243825" indent="0">
-              <a:buNone/>
-              <a:defRPr sz="747"/>
+            <a:lvl2pPr marL="297180" indent="0">
+              <a:buNone/>
+              <a:defRPr sz="910"/>
             </a:lvl2pPr>
-            <a:lvl3pPr marL="487650" indent="0">
-              <a:buNone/>
-              <a:defRPr sz="640"/>
+            <a:lvl3pPr marL="594360" indent="0">
+              <a:buNone/>
+              <a:defRPr sz="780"/>
             </a:lvl3pPr>
-            <a:lvl4pPr marL="731474" indent="0">
-              <a:buNone/>
-              <a:defRPr sz="533"/>
+            <a:lvl4pPr marL="891540" indent="0">
+              <a:buNone/>
+              <a:defRPr sz="650"/>
             </a:lvl4pPr>
-            <a:lvl5pPr marL="975299" indent="0">
-              <a:buNone/>
-              <a:defRPr sz="533"/>
+            <a:lvl5pPr marL="1188720" indent="0">
+              <a:buNone/>
+              <a:defRPr sz="650"/>
             </a:lvl5pPr>
-            <a:lvl6pPr marL="1219124" indent="0">
-              <a:buNone/>
-              <a:defRPr sz="533"/>
+            <a:lvl6pPr marL="1485900" indent="0">
+              <a:buNone/>
+              <a:defRPr sz="650"/>
             </a:lvl6pPr>
-            <a:lvl7pPr marL="1462949" indent="0">
-              <a:buNone/>
-              <a:defRPr sz="533"/>
+            <a:lvl7pPr marL="1783080" indent="0">
+              <a:buNone/>
+              <a:defRPr sz="650"/>
             </a:lvl7pPr>
-            <a:lvl8pPr marL="1706773" indent="0">
-              <a:buNone/>
-              <a:defRPr sz="533"/>
+            <a:lvl8pPr marL="2080260" indent="0">
+              <a:buNone/>
+              <a:defRPr sz="650"/>
             </a:lvl8pPr>
-            <a:lvl9pPr marL="1950598" indent="0">
-              <a:buNone/>
-              <a:defRPr sz="533"/>
+            <a:lvl9pPr marL="2377440" indent="0">
+              <a:buNone/>
+              <a:defRPr sz="650"/>
             </a:lvl9pPr>
           </a:lstStyle>
           <a:p>
@@ -2093,7 +2099,7 @@
           <a:p>
             <a:fld id="{84FE989D-8549-964F-B2BC-61F9DCA90181}" type="datetimeFigureOut">
               <a:rPr lang="en-US" smtClean="0"/>
-              <a:t>4/25/24</a:t>
+              <a:t>4/26/24</a:t>
             </a:fld>
             <a:endParaRPr lang="en-US"/>
           </a:p>
@@ -2144,7 +2150,7 @@
     </p:spTree>
     <p:extLst>
       <p:ext uri="{BB962C8B-B14F-4D97-AF65-F5344CB8AC3E}">
-        <p14:creationId xmlns:p14="http://schemas.microsoft.com/office/powerpoint/2010/main" val="2041567316"/>
+        <p14:creationId xmlns:p14="http://schemas.microsoft.com/office/powerpoint/2010/main" val="2622359355"/>
       </p:ext>
     </p:extLst>
   </p:cSld>
@@ -2183,15 +2189,15 @@
         </p:nvSpPr>
         <p:spPr>
           <a:xfrm>
-            <a:off x="1228190" y="243840"/>
-            <a:ext cx="5750897" cy="853440"/>
+            <a:off x="409397" y="731520"/>
+            <a:ext cx="1916966" cy="2560320"/>
           </a:xfrm>
         </p:spPr>
         <p:txBody>
           <a:bodyPr anchor="b"/>
           <a:lstStyle>
             <a:lvl1pPr>
-              <a:defRPr sz="1707"/>
+              <a:defRPr sz="2080"/>
             </a:lvl1pPr>
           </a:lstStyle>
           <a:p>
@@ -2215,8 +2221,8 @@
         </p:nvSpPr>
         <p:spPr>
           <a:xfrm>
-            <a:off x="7580412" y="526627"/>
-            <a:ext cx="9026843" cy="2599267"/>
+            <a:off x="2526804" y="1579882"/>
+            <a:ext cx="3008948" cy="7797800"/>
           </a:xfrm>
         </p:spPr>
         <p:txBody>
@@ -2224,39 +2230,39 @@
           <a:lstStyle>
             <a:lvl1pPr marL="0" indent="0">
               <a:buNone/>
-              <a:defRPr sz="1707"/>
+              <a:defRPr sz="2080"/>
             </a:lvl1pPr>
-            <a:lvl2pPr marL="243825" indent="0">
-              <a:buNone/>
-              <a:defRPr sz="1493"/>
+            <a:lvl2pPr marL="297180" indent="0">
+              <a:buNone/>
+              <a:defRPr sz="1820"/>
             </a:lvl2pPr>
-            <a:lvl3pPr marL="487650" indent="0">
-              <a:buNone/>
-              <a:defRPr sz="1280"/>
+            <a:lvl3pPr marL="594360" indent="0">
+              <a:buNone/>
+              <a:defRPr sz="1560"/>
             </a:lvl3pPr>
-            <a:lvl4pPr marL="731474" indent="0">
-              <a:buNone/>
-              <a:defRPr sz="1067"/>
+            <a:lvl4pPr marL="891540" indent="0">
+              <a:buNone/>
+              <a:defRPr sz="1300"/>
             </a:lvl4pPr>
-            <a:lvl5pPr marL="975299" indent="0">
-              <a:buNone/>
-              <a:defRPr sz="1067"/>
+            <a:lvl5pPr marL="1188720" indent="0">
+              <a:buNone/>
+              <a:defRPr sz="1300"/>
             </a:lvl5pPr>
-            <a:lvl6pPr marL="1219124" indent="0">
-              <a:buNone/>
-              <a:defRPr sz="1067"/>
+            <a:lvl6pPr marL="1485900" indent="0">
+              <a:buNone/>
+              <a:defRPr sz="1300"/>
             </a:lvl6pPr>
-            <a:lvl7pPr marL="1462949" indent="0">
-              <a:buNone/>
-              <a:defRPr sz="1067"/>
+            <a:lvl7pPr marL="1783080" indent="0">
+              <a:buNone/>
+              <a:defRPr sz="1300"/>
             </a:lvl7pPr>
-            <a:lvl8pPr marL="1706773" indent="0">
-              <a:buNone/>
-              <a:defRPr sz="1067"/>
+            <a:lvl8pPr marL="2080260" indent="0">
+              <a:buNone/>
+              <a:defRPr sz="1300"/>
             </a:lvl8pPr>
-            <a:lvl9pPr marL="1950598" indent="0">
-              <a:buNone/>
-              <a:defRPr sz="1067"/>
+            <a:lvl9pPr marL="2377440" indent="0">
+              <a:buNone/>
+              <a:defRPr sz="1300"/>
             </a:lvl9pPr>
           </a:lstStyle>
           <a:p>
@@ -2280,8 +2286,8 @@
         </p:nvSpPr>
         <p:spPr>
           <a:xfrm>
-            <a:off x="1228190" y="1097280"/>
-            <a:ext cx="5750897" cy="2032847"/>
+            <a:off x="409397" y="3291840"/>
+            <a:ext cx="1916966" cy="6098541"/>
           </a:xfrm>
         </p:spPr>
         <p:txBody>
@@ -2289,39 +2295,39 @@
           <a:lstStyle>
             <a:lvl1pPr marL="0" indent="0">
               <a:buNone/>
-              <a:defRPr sz="853"/>
+              <a:defRPr sz="1040"/>
             </a:lvl1pPr>
-            <a:lvl2pPr marL="243825" indent="0">
-              <a:buNone/>
-              <a:defRPr sz="747"/>
+            <a:lvl2pPr marL="297180" indent="0">
+              <a:buNone/>
+              <a:defRPr sz="910"/>
             </a:lvl2pPr>
-            <a:lvl3pPr marL="487650" indent="0">
-              <a:buNone/>
-              <a:defRPr sz="640"/>
+            <a:lvl3pPr marL="594360" indent="0">
+              <a:buNone/>
+              <a:defRPr sz="780"/>
             </a:lvl3pPr>
-            <a:lvl4pPr marL="731474" indent="0">
-              <a:buNone/>
-              <a:defRPr sz="533"/>
+            <a:lvl4pPr marL="891540" indent="0">
+              <a:buNone/>
+              <a:defRPr sz="650"/>
             </a:lvl4pPr>
-            <a:lvl5pPr marL="975299" indent="0">
-              <a:buNone/>
-              <a:defRPr sz="533"/>
+            <a:lvl5pPr marL="1188720" indent="0">
+              <a:buNone/>
+              <a:defRPr sz="650"/>
             </a:lvl5pPr>
-            <a:lvl6pPr marL="1219124" indent="0">
-              <a:buNone/>
-              <a:defRPr sz="533"/>
+            <a:lvl6pPr marL="1485900" indent="0">
+              <a:buNone/>
+              <a:defRPr sz="650"/>
             </a:lvl6pPr>
-            <a:lvl7pPr marL="1462949" indent="0">
-              <a:buNone/>
-              <a:defRPr sz="533"/>
+            <a:lvl7pPr marL="1783080" indent="0">
+              <a:buNone/>
+              <a:defRPr sz="650"/>
             </a:lvl7pPr>
-            <a:lvl8pPr marL="1706773" indent="0">
-              <a:buNone/>
-              <a:defRPr sz="533"/>
+            <a:lvl8pPr marL="2080260" indent="0">
+              <a:buNone/>
+              <a:defRPr sz="650"/>
             </a:lvl8pPr>
-            <a:lvl9pPr marL="1950598" indent="0">
-              <a:buNone/>
-              <a:defRPr sz="533"/>
+            <a:lvl9pPr marL="2377440" indent="0">
+              <a:buNone/>
+              <a:defRPr sz="650"/>
             </a:lvl9pPr>
           </a:lstStyle>
           <a:p>
@@ -2350,7 +2356,7 @@
           <a:p>
             <a:fld id="{84FE989D-8549-964F-B2BC-61F9DCA90181}" type="datetimeFigureOut">
               <a:rPr lang="en-US" smtClean="0"/>
-              <a:t>4/25/24</a:t>
+              <a:t>4/26/24</a:t>
             </a:fld>
             <a:endParaRPr lang="en-US"/>
           </a:p>
@@ -2401,7 +2407,7 @@
     </p:spTree>
     <p:extLst>
       <p:ext uri="{BB962C8B-B14F-4D97-AF65-F5344CB8AC3E}">
-        <p14:creationId xmlns:p14="http://schemas.microsoft.com/office/powerpoint/2010/main" val="3727560813"/>
+        <p14:creationId xmlns:p14="http://schemas.microsoft.com/office/powerpoint/2010/main" val="2846264297"/>
       </p:ext>
     </p:extLst>
   </p:cSld>
@@ -2445,8 +2451,8 @@
         </p:nvSpPr>
         <p:spPr>
           <a:xfrm>
-            <a:off x="1225868" y="194734"/>
-            <a:ext cx="15379065" cy="706967"/>
+            <a:off x="408623" y="584202"/>
+            <a:ext cx="5126355" cy="2120901"/>
           </a:xfrm>
           <a:prstGeom prst="rect">
             <a:avLst/>
@@ -2478,8 +2484,8 @@
         </p:nvSpPr>
         <p:spPr>
           <a:xfrm>
-            <a:off x="1225868" y="973666"/>
-            <a:ext cx="15379065" cy="2320714"/>
+            <a:off x="408623" y="2921000"/>
+            <a:ext cx="5126355" cy="6962141"/>
           </a:xfrm>
           <a:prstGeom prst="rect">
             <a:avLst/>
@@ -2540,8 +2546,8 @@
         </p:nvSpPr>
         <p:spPr>
           <a:xfrm>
-            <a:off x="1225868" y="3390054"/>
-            <a:ext cx="4011930" cy="194733"/>
+            <a:off x="408622" y="10170162"/>
+            <a:ext cx="1337310" cy="584200"/>
           </a:xfrm>
           <a:prstGeom prst="rect">
             <a:avLst/>
@@ -2551,7 +2557,7 @@
           <a:bodyPr vert="horz" lIns="91440" tIns="45720" rIns="91440" bIns="45720" rtlCol="0" anchor="ctr"/>
           <a:lstStyle>
             <a:lvl1pPr algn="l">
-              <a:defRPr sz="640">
+              <a:defRPr sz="780">
                 <a:solidFill>
                   <a:schemeClr val="tx1">
                     <a:tint val="82000"/>
@@ -2563,7 +2569,7 @@
           <a:p>
             <a:fld id="{84FE989D-8549-964F-B2BC-61F9DCA90181}" type="datetimeFigureOut">
               <a:rPr lang="en-US" smtClean="0"/>
-              <a:t>4/25/24</a:t>
+              <a:t>4/26/24</a:t>
             </a:fld>
             <a:endParaRPr lang="en-US"/>
           </a:p>
@@ -2581,8 +2587,8 @@
         </p:nvSpPr>
         <p:spPr>
           <a:xfrm>
-            <a:off x="5906453" y="3390054"/>
-            <a:ext cx="6017895" cy="194733"/>
+            <a:off x="1968818" y="10170162"/>
+            <a:ext cx="2005965" cy="584200"/>
           </a:xfrm>
           <a:prstGeom prst="rect">
             <a:avLst/>
@@ -2592,7 +2598,7 @@
           <a:bodyPr vert="horz" lIns="91440" tIns="45720" rIns="91440" bIns="45720" rtlCol="0" anchor="ctr"/>
           <a:lstStyle>
             <a:lvl1pPr algn="ctr">
-              <a:defRPr sz="640">
+              <a:defRPr sz="780">
                 <a:solidFill>
                   <a:schemeClr val="tx1">
                     <a:tint val="82000"/>
@@ -2618,8 +2624,8 @@
         </p:nvSpPr>
         <p:spPr>
           <a:xfrm>
-            <a:off x="12593003" y="3390054"/>
-            <a:ext cx="4011930" cy="194733"/>
+            <a:off x="4197668" y="10170162"/>
+            <a:ext cx="1337310" cy="584200"/>
           </a:xfrm>
           <a:prstGeom prst="rect">
             <a:avLst/>
@@ -2629,7 +2635,7 @@
           <a:bodyPr vert="horz" lIns="91440" tIns="45720" rIns="91440" bIns="45720" rtlCol="0" anchor="ctr"/>
           <a:lstStyle>
             <a:lvl1pPr algn="r">
-              <a:defRPr sz="640">
+              <a:defRPr sz="780">
                 <a:solidFill>
                   <a:schemeClr val="tx1">
                     <a:tint val="82000"/>
@@ -2650,27 +2656,27 @@
     </p:spTree>
     <p:extLst>
       <p:ext uri="{BB962C8B-B14F-4D97-AF65-F5344CB8AC3E}">
-        <p14:creationId xmlns:p14="http://schemas.microsoft.com/office/powerpoint/2010/main" val="2041067268"/>
+        <p14:creationId xmlns:p14="http://schemas.microsoft.com/office/powerpoint/2010/main" val="264393843"/>
       </p:ext>
     </p:extLst>
   </p:cSld>
   <p:clrMap bg1="lt1" tx1="dk1" bg2="lt2" tx2="dk2" accent1="accent1" accent2="accent2" accent3="accent3" accent4="accent4" accent5="accent5" accent6="accent6" hlink="hlink" folHlink="folHlink"/>
   <p:sldLayoutIdLst>
-    <p:sldLayoutId id="2147483673" r:id="rId1"/>
-    <p:sldLayoutId id="2147483674" r:id="rId2"/>
-    <p:sldLayoutId id="2147483675" r:id="rId3"/>
-    <p:sldLayoutId id="2147483676" r:id="rId4"/>
-    <p:sldLayoutId id="2147483677" r:id="rId5"/>
-    <p:sldLayoutId id="2147483678" r:id="rId6"/>
-    <p:sldLayoutId id="2147483679" r:id="rId7"/>
-    <p:sldLayoutId id="2147483680" r:id="rId8"/>
-    <p:sldLayoutId id="2147483681" r:id="rId9"/>
-    <p:sldLayoutId id="2147483682" r:id="rId10"/>
-    <p:sldLayoutId id="2147483683" r:id="rId11"/>
+    <p:sldLayoutId id="2147483685" r:id="rId1"/>
+    <p:sldLayoutId id="2147483686" r:id="rId2"/>
+    <p:sldLayoutId id="2147483687" r:id="rId3"/>
+    <p:sldLayoutId id="2147483688" r:id="rId4"/>
+    <p:sldLayoutId id="2147483689" r:id="rId5"/>
+    <p:sldLayoutId id="2147483690" r:id="rId6"/>
+    <p:sldLayoutId id="2147483691" r:id="rId7"/>
+    <p:sldLayoutId id="2147483692" r:id="rId8"/>
+    <p:sldLayoutId id="2147483693" r:id="rId9"/>
+    <p:sldLayoutId id="2147483694" r:id="rId10"/>
+    <p:sldLayoutId id="2147483695" r:id="rId11"/>
   </p:sldLayoutIdLst>
   <p:txStyles>
     <p:titleStyle>
-      <a:lvl1pPr algn="l" defTabSz="487650" rtl="0" eaLnBrk="1" latinLnBrk="0" hangingPunct="1">
+      <a:lvl1pPr algn="l" defTabSz="594360" rtl="0" eaLnBrk="1" latinLnBrk="0" hangingPunct="1">
         <a:lnSpc>
           <a:spcPct val="90000"/>
         </a:lnSpc>
@@ -2678,7 +2684,7 @@
           <a:spcPct val="0"/>
         </a:spcBef>
         <a:buNone/>
-        <a:defRPr sz="2347" kern="1200">
+        <a:defRPr sz="2860" kern="1200">
           <a:solidFill>
             <a:schemeClr val="tx1"/>
           </a:solidFill>
@@ -2689,16 +2695,16 @@
       </a:lvl1pPr>
     </p:titleStyle>
     <p:bodyStyle>
-      <a:lvl1pPr marL="121912" indent="-121912" algn="l" defTabSz="487650" rtl="0" eaLnBrk="1" latinLnBrk="0" hangingPunct="1">
+      <a:lvl1pPr marL="148590" indent="-148590" algn="l" defTabSz="594360" rtl="0" eaLnBrk="1" latinLnBrk="0" hangingPunct="1">
         <a:lnSpc>
           <a:spcPct val="90000"/>
         </a:lnSpc>
         <a:spcBef>
-          <a:spcPts val="533"/>
+          <a:spcPts val="650"/>
         </a:spcBef>
         <a:buFont typeface="Arial" panose="020B0604020202020204" pitchFamily="34" charset="0"/>
         <a:buChar char="•"/>
-        <a:defRPr sz="1493" kern="1200">
+        <a:defRPr sz="1820" kern="1200">
           <a:solidFill>
             <a:schemeClr val="tx1"/>
           </a:solidFill>
@@ -2707,16 +2713,16 @@
           <a:cs typeface="+mn-cs"/>
         </a:defRPr>
       </a:lvl1pPr>
-      <a:lvl2pPr marL="365737" indent="-121912" algn="l" defTabSz="487650" rtl="0" eaLnBrk="1" latinLnBrk="0" hangingPunct="1">
+      <a:lvl2pPr marL="445770" indent="-148590" algn="l" defTabSz="594360" rtl="0" eaLnBrk="1" latinLnBrk="0" hangingPunct="1">
         <a:lnSpc>
           <a:spcPct val="90000"/>
         </a:lnSpc>
         <a:spcBef>
-          <a:spcPts val="267"/>
+          <a:spcPts val="325"/>
         </a:spcBef>
         <a:buFont typeface="Arial" panose="020B0604020202020204" pitchFamily="34" charset="0"/>
         <a:buChar char="•"/>
-        <a:defRPr sz="1280" kern="1200">
+        <a:defRPr sz="1560" kern="1200">
           <a:solidFill>
             <a:schemeClr val="tx1"/>
           </a:solidFill>
@@ -2725,16 +2731,16 @@
           <a:cs typeface="+mn-cs"/>
         </a:defRPr>
       </a:lvl2pPr>
-      <a:lvl3pPr marL="609562" indent="-121912" algn="l" defTabSz="487650" rtl="0" eaLnBrk="1" latinLnBrk="0" hangingPunct="1">
+      <a:lvl3pPr marL="742950" indent="-148590" algn="l" defTabSz="594360" rtl="0" eaLnBrk="1" latinLnBrk="0" hangingPunct="1">
         <a:lnSpc>
           <a:spcPct val="90000"/>
         </a:lnSpc>
         <a:spcBef>
-          <a:spcPts val="267"/>
+          <a:spcPts val="325"/>
         </a:spcBef>
         <a:buFont typeface="Arial" panose="020B0604020202020204" pitchFamily="34" charset="0"/>
         <a:buChar char="•"/>
-        <a:defRPr sz="1067" kern="1200">
+        <a:defRPr sz="1300" kern="1200">
           <a:solidFill>
             <a:schemeClr val="tx1"/>
           </a:solidFill>
@@ -2743,16 +2749,16 @@
           <a:cs typeface="+mn-cs"/>
         </a:defRPr>
       </a:lvl3pPr>
-      <a:lvl4pPr marL="853387" indent="-121912" algn="l" defTabSz="487650" rtl="0" eaLnBrk="1" latinLnBrk="0" hangingPunct="1">
+      <a:lvl4pPr marL="1040130" indent="-148590" algn="l" defTabSz="594360" rtl="0" eaLnBrk="1" latinLnBrk="0" hangingPunct="1">
         <a:lnSpc>
           <a:spcPct val="90000"/>
         </a:lnSpc>
         <a:spcBef>
-          <a:spcPts val="267"/>
+          <a:spcPts val="325"/>
         </a:spcBef>
         <a:buFont typeface="Arial" panose="020B0604020202020204" pitchFamily="34" charset="0"/>
         <a:buChar char="•"/>
-        <a:defRPr sz="960" kern="1200">
+        <a:defRPr sz="1170" kern="1200">
           <a:solidFill>
             <a:schemeClr val="tx1"/>
           </a:solidFill>
@@ -2761,16 +2767,16 @@
           <a:cs typeface="+mn-cs"/>
         </a:defRPr>
       </a:lvl4pPr>
-      <a:lvl5pPr marL="1097211" indent="-121912" algn="l" defTabSz="487650" rtl="0" eaLnBrk="1" latinLnBrk="0" hangingPunct="1">
+      <a:lvl5pPr marL="1337310" indent="-148590" algn="l" defTabSz="594360" rtl="0" eaLnBrk="1" latinLnBrk="0" hangingPunct="1">
         <a:lnSpc>
           <a:spcPct val="90000"/>
         </a:lnSpc>
         <a:spcBef>
-          <a:spcPts val="267"/>
+          <a:spcPts val="325"/>
         </a:spcBef>
         <a:buFont typeface="Arial" panose="020B0604020202020204" pitchFamily="34" charset="0"/>
         <a:buChar char="•"/>
-        <a:defRPr sz="960" kern="1200">
+        <a:defRPr sz="1170" kern="1200">
           <a:solidFill>
             <a:schemeClr val="tx1"/>
           </a:solidFill>
@@ -2779,16 +2785,16 @@
           <a:cs typeface="+mn-cs"/>
         </a:defRPr>
       </a:lvl5pPr>
-      <a:lvl6pPr marL="1341036" indent="-121912" algn="l" defTabSz="487650" rtl="0" eaLnBrk="1" latinLnBrk="0" hangingPunct="1">
+      <a:lvl6pPr marL="1634490" indent="-148590" algn="l" defTabSz="594360" rtl="0" eaLnBrk="1" latinLnBrk="0" hangingPunct="1">
         <a:lnSpc>
           <a:spcPct val="90000"/>
         </a:lnSpc>
         <a:spcBef>
-          <a:spcPts val="267"/>
+          <a:spcPts val="325"/>
         </a:spcBef>
         <a:buFont typeface="Arial" panose="020B0604020202020204" pitchFamily="34" charset="0"/>
         <a:buChar char="•"/>
-        <a:defRPr sz="960" kern="1200">
+        <a:defRPr sz="1170" kern="1200">
           <a:solidFill>
             <a:schemeClr val="tx1"/>
           </a:solidFill>
@@ -2797,16 +2803,16 @@
           <a:cs typeface="+mn-cs"/>
         </a:defRPr>
       </a:lvl6pPr>
-      <a:lvl7pPr marL="1584861" indent="-121912" algn="l" defTabSz="487650" rtl="0" eaLnBrk="1" latinLnBrk="0" hangingPunct="1">
+      <a:lvl7pPr marL="1931670" indent="-148590" algn="l" defTabSz="594360" rtl="0" eaLnBrk="1" latinLnBrk="0" hangingPunct="1">
         <a:lnSpc>
           <a:spcPct val="90000"/>
         </a:lnSpc>
         <a:spcBef>
-          <a:spcPts val="267"/>
+          <a:spcPts val="325"/>
         </a:spcBef>
         <a:buFont typeface="Arial" panose="020B0604020202020204" pitchFamily="34" charset="0"/>
         <a:buChar char="•"/>
-        <a:defRPr sz="960" kern="1200">
+        <a:defRPr sz="1170" kern="1200">
           <a:solidFill>
             <a:schemeClr val="tx1"/>
           </a:solidFill>
@@ -2815,16 +2821,16 @@
           <a:cs typeface="+mn-cs"/>
         </a:defRPr>
       </a:lvl7pPr>
-      <a:lvl8pPr marL="1828686" indent="-121912" algn="l" defTabSz="487650" rtl="0" eaLnBrk="1" latinLnBrk="0" hangingPunct="1">
+      <a:lvl8pPr marL="2228850" indent="-148590" algn="l" defTabSz="594360" rtl="0" eaLnBrk="1" latinLnBrk="0" hangingPunct="1">
         <a:lnSpc>
           <a:spcPct val="90000"/>
         </a:lnSpc>
         <a:spcBef>
-          <a:spcPts val="267"/>
+          <a:spcPts val="325"/>
         </a:spcBef>
         <a:buFont typeface="Arial" panose="020B0604020202020204" pitchFamily="34" charset="0"/>
         <a:buChar char="•"/>
-        <a:defRPr sz="960" kern="1200">
+        <a:defRPr sz="1170" kern="1200">
           <a:solidFill>
             <a:schemeClr val="tx1"/>
           </a:solidFill>
@@ -2833,16 +2839,16 @@
           <a:cs typeface="+mn-cs"/>
         </a:defRPr>
       </a:lvl8pPr>
-      <a:lvl9pPr marL="2072510" indent="-121912" algn="l" defTabSz="487650" rtl="0" eaLnBrk="1" latinLnBrk="0" hangingPunct="1">
+      <a:lvl9pPr marL="2526030" indent="-148590" algn="l" defTabSz="594360" rtl="0" eaLnBrk="1" latinLnBrk="0" hangingPunct="1">
         <a:lnSpc>
           <a:spcPct val="90000"/>
         </a:lnSpc>
         <a:spcBef>
-          <a:spcPts val="267"/>
+          <a:spcPts val="325"/>
         </a:spcBef>
         <a:buFont typeface="Arial" panose="020B0604020202020204" pitchFamily="34" charset="0"/>
         <a:buChar char="•"/>
-        <a:defRPr sz="960" kern="1200">
+        <a:defRPr sz="1170" kern="1200">
           <a:solidFill>
             <a:schemeClr val="tx1"/>
           </a:solidFill>
@@ -2856,8 +2862,8 @@
       <a:defPPr>
         <a:defRPr lang="en-US"/>
       </a:defPPr>
-      <a:lvl1pPr marL="0" algn="l" defTabSz="487650" rtl="0" eaLnBrk="1" latinLnBrk="0" hangingPunct="1">
-        <a:defRPr sz="960" kern="1200">
+      <a:lvl1pPr marL="0" algn="l" defTabSz="594360" rtl="0" eaLnBrk="1" latinLnBrk="0" hangingPunct="1">
+        <a:defRPr sz="1170" kern="1200">
           <a:solidFill>
             <a:schemeClr val="tx1"/>
           </a:solidFill>
@@ -2866,8 +2872,8 @@
           <a:cs typeface="+mn-cs"/>
         </a:defRPr>
       </a:lvl1pPr>
-      <a:lvl2pPr marL="243825" algn="l" defTabSz="487650" rtl="0" eaLnBrk="1" latinLnBrk="0" hangingPunct="1">
-        <a:defRPr sz="960" kern="1200">
+      <a:lvl2pPr marL="297180" algn="l" defTabSz="594360" rtl="0" eaLnBrk="1" latinLnBrk="0" hangingPunct="1">
+        <a:defRPr sz="1170" kern="1200">
           <a:solidFill>
             <a:schemeClr val="tx1"/>
           </a:solidFill>
@@ -2876,8 +2882,8 @@
           <a:cs typeface="+mn-cs"/>
         </a:defRPr>
       </a:lvl2pPr>
-      <a:lvl3pPr marL="487650" algn="l" defTabSz="487650" rtl="0" eaLnBrk="1" latinLnBrk="0" hangingPunct="1">
-        <a:defRPr sz="960" kern="1200">
+      <a:lvl3pPr marL="594360" algn="l" defTabSz="594360" rtl="0" eaLnBrk="1" latinLnBrk="0" hangingPunct="1">
+        <a:defRPr sz="1170" kern="1200">
           <a:solidFill>
             <a:schemeClr val="tx1"/>
           </a:solidFill>
@@ -2886,8 +2892,8 @@
           <a:cs typeface="+mn-cs"/>
         </a:defRPr>
       </a:lvl3pPr>
-      <a:lvl4pPr marL="731474" algn="l" defTabSz="487650" rtl="0" eaLnBrk="1" latinLnBrk="0" hangingPunct="1">
-        <a:defRPr sz="960" kern="1200">
+      <a:lvl4pPr marL="891540" algn="l" defTabSz="594360" rtl="0" eaLnBrk="1" latinLnBrk="0" hangingPunct="1">
+        <a:defRPr sz="1170" kern="1200">
           <a:solidFill>
             <a:schemeClr val="tx1"/>
           </a:solidFill>
@@ -2896,8 +2902,8 @@
           <a:cs typeface="+mn-cs"/>
         </a:defRPr>
       </a:lvl4pPr>
-      <a:lvl5pPr marL="975299" algn="l" defTabSz="487650" rtl="0" eaLnBrk="1" latinLnBrk="0" hangingPunct="1">
-        <a:defRPr sz="960" kern="1200">
+      <a:lvl5pPr marL="1188720" algn="l" defTabSz="594360" rtl="0" eaLnBrk="1" latinLnBrk="0" hangingPunct="1">
+        <a:defRPr sz="1170" kern="1200">
           <a:solidFill>
             <a:schemeClr val="tx1"/>
           </a:solidFill>
@@ -2906,8 +2912,8 @@
           <a:cs typeface="+mn-cs"/>
         </a:defRPr>
       </a:lvl5pPr>
-      <a:lvl6pPr marL="1219124" algn="l" defTabSz="487650" rtl="0" eaLnBrk="1" latinLnBrk="0" hangingPunct="1">
-        <a:defRPr sz="960" kern="1200">
+      <a:lvl6pPr marL="1485900" algn="l" defTabSz="594360" rtl="0" eaLnBrk="1" latinLnBrk="0" hangingPunct="1">
+        <a:defRPr sz="1170" kern="1200">
           <a:solidFill>
             <a:schemeClr val="tx1"/>
           </a:solidFill>
@@ -2916,8 +2922,8 @@
           <a:cs typeface="+mn-cs"/>
         </a:defRPr>
       </a:lvl6pPr>
-      <a:lvl7pPr marL="1462949" algn="l" defTabSz="487650" rtl="0" eaLnBrk="1" latinLnBrk="0" hangingPunct="1">
-        <a:defRPr sz="960" kern="1200">
+      <a:lvl7pPr marL="1783080" algn="l" defTabSz="594360" rtl="0" eaLnBrk="1" latinLnBrk="0" hangingPunct="1">
+        <a:defRPr sz="1170" kern="1200">
           <a:solidFill>
             <a:schemeClr val="tx1"/>
           </a:solidFill>
@@ -2926,8 +2932,8 @@
           <a:cs typeface="+mn-cs"/>
         </a:defRPr>
       </a:lvl7pPr>
-      <a:lvl8pPr marL="1706773" algn="l" defTabSz="487650" rtl="0" eaLnBrk="1" latinLnBrk="0" hangingPunct="1">
-        <a:defRPr sz="960" kern="1200">
+      <a:lvl8pPr marL="2080260" algn="l" defTabSz="594360" rtl="0" eaLnBrk="1" latinLnBrk="0" hangingPunct="1">
+        <a:defRPr sz="1170" kern="1200">
           <a:solidFill>
             <a:schemeClr val="tx1"/>
           </a:solidFill>
@@ -2936,8 +2942,8 @@
           <a:cs typeface="+mn-cs"/>
         </a:defRPr>
       </a:lvl8pPr>
-      <a:lvl9pPr marL="1950598" algn="l" defTabSz="487650" rtl="0" eaLnBrk="1" latinLnBrk="0" hangingPunct="1">
-        <a:defRPr sz="960" kern="1200">
+      <a:lvl9pPr marL="2377440" algn="l" defTabSz="594360" rtl="0" eaLnBrk="1" latinLnBrk="0" hangingPunct="1">
+        <a:defRPr sz="1170" kern="1200">
           <a:solidFill>
             <a:schemeClr val="tx1"/>
           </a:solidFill>
@@ -2968,12 +2974,345 @@
           <a:chExt cx="0" cy="0"/>
         </a:xfrm>
       </p:grpSpPr>
+      <p:sp>
+        <p:nvSpPr>
+          <p:cNvPr id="13" name="TextBox 12">
+            <a:extLst>
+              <a:ext uri="{FF2B5EF4-FFF2-40B4-BE49-F238E27FC236}">
+                <a16:creationId xmlns:a16="http://schemas.microsoft.com/office/drawing/2014/main" id="{CC6B69B6-8D9A-BF4D-9A59-C50F2432116C}"/>
+              </a:ext>
+            </a:extLst>
+          </p:cNvPr>
+          <p:cNvSpPr txBox="1"/>
+          <p:nvPr/>
+        </p:nvSpPr>
+        <p:spPr>
+          <a:xfrm>
+            <a:off x="0" y="7508630"/>
+            <a:ext cx="1037492" cy="923330"/>
+          </a:xfrm>
+          <a:prstGeom prst="rect">
+            <a:avLst/>
+          </a:prstGeom>
+          <a:noFill/>
+        </p:spPr>
+        <p:txBody>
+          <a:bodyPr wrap="square" rtlCol="0">
+            <a:spAutoFit/>
+          </a:bodyPr>
+          <a:lstStyle/>
+          <a:p>
+            <a:r>
+              <a:rPr lang="en-US" sz="5400" dirty="0"/>
+              <a:t>C)</a:t>
+            </a:r>
+          </a:p>
+        </p:txBody>
+      </p:sp>
+      <p:grpSp>
+        <p:nvGrpSpPr>
+          <p:cNvPr id="6" name="Group 5">
+            <a:extLst>
+              <a:ext uri="{FF2B5EF4-FFF2-40B4-BE49-F238E27FC236}">
+                <a16:creationId xmlns:a16="http://schemas.microsoft.com/office/drawing/2014/main" id="{5BB94794-3928-32D4-2082-BBDB65A94229}"/>
+              </a:ext>
+            </a:extLst>
+          </p:cNvPr>
+          <p:cNvGrpSpPr/>
+          <p:nvPr/>
+        </p:nvGrpSpPr>
+        <p:grpSpPr>
+          <a:xfrm>
+            <a:off x="0" y="0"/>
+            <a:ext cx="5943601" cy="3668050"/>
+            <a:chOff x="0" y="0"/>
+            <a:chExt cx="5943601" cy="3668050"/>
+          </a:xfrm>
+        </p:grpSpPr>
+        <p:pic>
+          <p:nvPicPr>
+            <p:cNvPr id="8" name="Picture 7">
+              <a:extLst>
+                <a:ext uri="{FF2B5EF4-FFF2-40B4-BE49-F238E27FC236}">
+                  <a16:creationId xmlns:a16="http://schemas.microsoft.com/office/drawing/2014/main" id="{C5BBC697-7A3E-801E-C8EF-6844A00DE9C8}"/>
+                </a:ext>
+              </a:extLst>
+            </p:cNvPr>
+            <p:cNvPicPr>
+              <a:picLocks noChangeAspect="1"/>
+            </p:cNvPicPr>
+            <p:nvPr/>
+          </p:nvPicPr>
+          <p:blipFill>
+            <a:blip r:embed="rId2"/>
+            <a:stretch>
+              <a:fillRect/>
+            </a:stretch>
+          </p:blipFill>
+          <p:spPr>
+            <a:xfrm>
+              <a:off x="1" y="0"/>
+              <a:ext cx="5943600" cy="3668050"/>
+            </a:xfrm>
+            <a:prstGeom prst="rect">
+              <a:avLst/>
+            </a:prstGeom>
+            <a:ln>
+              <a:solidFill>
+                <a:schemeClr val="tx1"/>
+              </a:solidFill>
+            </a:ln>
+          </p:spPr>
+        </p:pic>
+        <p:pic>
+          <p:nvPicPr>
+            <p:cNvPr id="2" name="Picture 1">
+              <a:extLst>
+                <a:ext uri="{FF2B5EF4-FFF2-40B4-BE49-F238E27FC236}">
+                  <a16:creationId xmlns:a16="http://schemas.microsoft.com/office/drawing/2014/main" id="{76E01013-B349-DAD0-67AB-F51506D6C539}"/>
+                </a:ext>
+              </a:extLst>
+            </p:cNvPr>
+            <p:cNvPicPr>
+              <a:picLocks noChangeAspect="1"/>
+            </p:cNvPicPr>
+            <p:nvPr/>
+          </p:nvPicPr>
+          <p:blipFill rotWithShape="1">
+            <a:blip r:embed="rId3"/>
+            <a:srcRect b="81161"/>
+            <a:stretch/>
+          </p:blipFill>
+          <p:spPr>
+            <a:xfrm>
+              <a:off x="0" y="0"/>
+              <a:ext cx="5943600" cy="691025"/>
+            </a:xfrm>
+            <a:prstGeom prst="rect">
+              <a:avLst/>
+            </a:prstGeom>
+            <a:ln>
+              <a:solidFill>
+                <a:schemeClr val="tx1"/>
+              </a:solidFill>
+            </a:ln>
+          </p:spPr>
+        </p:pic>
+      </p:grpSp>
+      <p:grpSp>
+        <p:nvGrpSpPr>
+          <p:cNvPr id="7" name="Group 6">
+            <a:extLst>
+              <a:ext uri="{FF2B5EF4-FFF2-40B4-BE49-F238E27FC236}">
+                <a16:creationId xmlns:a16="http://schemas.microsoft.com/office/drawing/2014/main" id="{45EA1271-DF8C-035E-7E31-6FC6758A65BE}"/>
+              </a:ext>
+            </a:extLst>
+          </p:cNvPr>
+          <p:cNvGrpSpPr/>
+          <p:nvPr/>
+        </p:nvGrpSpPr>
+        <p:grpSpPr>
+          <a:xfrm>
+            <a:off x="-4762" y="3729428"/>
+            <a:ext cx="5952276" cy="3212160"/>
+            <a:chOff x="-8676" y="3964173"/>
+            <a:chExt cx="5952276" cy="3212160"/>
+          </a:xfrm>
+        </p:grpSpPr>
+        <p:pic>
+          <p:nvPicPr>
+            <p:cNvPr id="4" name="Picture 3">
+              <a:extLst>
+                <a:ext uri="{FF2B5EF4-FFF2-40B4-BE49-F238E27FC236}">
+                  <a16:creationId xmlns:a16="http://schemas.microsoft.com/office/drawing/2014/main" id="{56E6DBD8-3E35-AF46-9E36-67BE151D10A6}"/>
+                </a:ext>
+              </a:extLst>
+            </p:cNvPr>
+            <p:cNvPicPr>
+              <a:picLocks noChangeAspect="1"/>
+            </p:cNvPicPr>
+            <p:nvPr/>
+          </p:nvPicPr>
+          <p:blipFill rotWithShape="1">
+            <a:blip r:embed="rId4"/>
+            <a:srcRect t="12557"/>
+            <a:stretch/>
+          </p:blipFill>
+          <p:spPr>
+            <a:xfrm>
+              <a:off x="-8676" y="3964173"/>
+              <a:ext cx="5952276" cy="3212160"/>
+            </a:xfrm>
+            <a:prstGeom prst="rect">
+              <a:avLst/>
+            </a:prstGeom>
+            <a:ln>
+              <a:solidFill>
+                <a:schemeClr val="tx1"/>
+              </a:solidFill>
+            </a:ln>
+          </p:spPr>
+        </p:pic>
+        <p:pic>
+          <p:nvPicPr>
+            <p:cNvPr id="3" name="Picture 2">
+              <a:extLst>
+                <a:ext uri="{FF2B5EF4-FFF2-40B4-BE49-F238E27FC236}">
+                  <a16:creationId xmlns:a16="http://schemas.microsoft.com/office/drawing/2014/main" id="{7B2B1E68-E430-F194-C645-F194F61DFACF}"/>
+                </a:ext>
+              </a:extLst>
+            </p:cNvPr>
+            <p:cNvPicPr>
+              <a:picLocks noChangeAspect="1"/>
+            </p:cNvPicPr>
+            <p:nvPr/>
+          </p:nvPicPr>
+          <p:blipFill rotWithShape="1">
+            <a:blip r:embed="rId3"/>
+            <a:srcRect t="12354" b="81159"/>
+            <a:stretch/>
+          </p:blipFill>
+          <p:spPr>
+            <a:xfrm>
+              <a:off x="0" y="3979060"/>
+              <a:ext cx="5943600" cy="237936"/>
+            </a:xfrm>
+            <a:prstGeom prst="rect">
+              <a:avLst/>
+            </a:prstGeom>
+            <a:ln>
+              <a:solidFill>
+                <a:schemeClr val="tx1"/>
+              </a:solidFill>
+            </a:ln>
+          </p:spPr>
+        </p:pic>
+      </p:grpSp>
+      <p:grpSp>
+        <p:nvGrpSpPr>
+          <p:cNvPr id="9" name="Group 8">
+            <a:extLst>
+              <a:ext uri="{FF2B5EF4-FFF2-40B4-BE49-F238E27FC236}">
+                <a16:creationId xmlns:a16="http://schemas.microsoft.com/office/drawing/2014/main" id="{E4E45281-7D68-815F-FC1E-9F7488B4914D}"/>
+              </a:ext>
+            </a:extLst>
+          </p:cNvPr>
+          <p:cNvGrpSpPr/>
+          <p:nvPr/>
+        </p:nvGrpSpPr>
+        <p:grpSpPr>
+          <a:xfrm>
+            <a:off x="-6719" y="7018474"/>
+            <a:ext cx="5952276" cy="3212160"/>
+            <a:chOff x="-17352" y="7301236"/>
+            <a:chExt cx="5952275" cy="3212160"/>
+          </a:xfrm>
+        </p:grpSpPr>
+        <p:pic>
+          <p:nvPicPr>
+            <p:cNvPr id="10" name="Picture 9">
+              <a:extLst>
+                <a:ext uri="{FF2B5EF4-FFF2-40B4-BE49-F238E27FC236}">
+                  <a16:creationId xmlns:a16="http://schemas.microsoft.com/office/drawing/2014/main" id="{B709E95D-E445-C48F-FDA8-1FF1CF1AC675}"/>
+                </a:ext>
+              </a:extLst>
+            </p:cNvPr>
+            <p:cNvPicPr>
+              <a:picLocks noChangeAspect="1"/>
+            </p:cNvPicPr>
+            <p:nvPr/>
+          </p:nvPicPr>
+          <p:blipFill rotWithShape="1">
+            <a:blip r:embed="rId5"/>
+            <a:srcRect t="12557"/>
+            <a:stretch/>
+          </p:blipFill>
+          <p:spPr>
+            <a:xfrm>
+              <a:off x="-17352" y="7301236"/>
+              <a:ext cx="5952275" cy="3212160"/>
+            </a:xfrm>
+            <a:prstGeom prst="rect">
+              <a:avLst/>
+            </a:prstGeom>
+            <a:ln>
+              <a:solidFill>
+                <a:schemeClr val="tx1"/>
+              </a:solidFill>
+            </a:ln>
+          </p:spPr>
+        </p:pic>
+        <p:pic>
+          <p:nvPicPr>
+            <p:cNvPr id="5" name="Picture 4">
+              <a:extLst>
+                <a:ext uri="{FF2B5EF4-FFF2-40B4-BE49-F238E27FC236}">
+                  <a16:creationId xmlns:a16="http://schemas.microsoft.com/office/drawing/2014/main" id="{26146E3D-CB9A-D569-DB55-5ED9F11E8D15}"/>
+                </a:ext>
+              </a:extLst>
+            </p:cNvPr>
+            <p:cNvPicPr>
+              <a:picLocks noChangeAspect="1"/>
+            </p:cNvPicPr>
+            <p:nvPr/>
+          </p:nvPicPr>
+          <p:blipFill rotWithShape="1">
+            <a:blip r:embed="rId3"/>
+            <a:srcRect t="12354" b="81159"/>
+            <a:stretch/>
+          </p:blipFill>
+          <p:spPr>
+            <a:xfrm>
+              <a:off x="-17352" y="7301236"/>
+              <a:ext cx="5943600" cy="237936"/>
+            </a:xfrm>
+            <a:prstGeom prst="rect">
+              <a:avLst/>
+            </a:prstGeom>
+            <a:ln>
+              <a:solidFill>
+                <a:schemeClr val="tx1"/>
+              </a:solidFill>
+            </a:ln>
+          </p:spPr>
+        </p:pic>
+      </p:grpSp>
+    </p:spTree>
+    <p:extLst>
+      <p:ext uri="{BB962C8B-B14F-4D97-AF65-F5344CB8AC3E}">
+        <p14:creationId xmlns:p14="http://schemas.microsoft.com/office/powerpoint/2010/main" val="4037679570"/>
+      </p:ext>
+    </p:extLst>
+  </p:cSld>
+  <p:clrMapOvr>
+    <a:masterClrMapping/>
+  </p:clrMapOvr>
+</p:sld>
+</file>
+
+<file path=ppt/slides/slide2.xml><?xml version="1.0" encoding="utf-8"?>
+<p:sld xmlns:a="http://schemas.openxmlformats.org/drawingml/2006/main" xmlns:r="http://schemas.openxmlformats.org/officeDocument/2006/relationships" xmlns:p="http://schemas.openxmlformats.org/presentationml/2006/main">
+  <p:cSld>
+    <p:spTree>
+      <p:nvGrpSpPr>
+        <p:cNvPr id="1" name=""/>
+        <p:cNvGrpSpPr/>
+        <p:nvPr/>
+      </p:nvGrpSpPr>
+      <p:grpSpPr>
+        <a:xfrm>
+          <a:off x="0" y="0"/>
+          <a:ext cx="0" cy="0"/>
+          <a:chOff x="0" y="0"/>
+          <a:chExt cx="0" cy="0"/>
+        </a:xfrm>
+      </p:grpSpPr>
       <p:pic>
         <p:nvPicPr>
-          <p:cNvPr id="4" name="Picture 3">
+          <p:cNvPr id="6" name="Picture 5">
             <a:extLst>
               <a:ext uri="{FF2B5EF4-FFF2-40B4-BE49-F238E27FC236}">
-                <a16:creationId xmlns:a16="http://schemas.microsoft.com/office/drawing/2014/main" id="{56E6DBD8-3E35-AF46-9E36-67BE151D10A6}"/>
+                <a16:creationId xmlns:a16="http://schemas.microsoft.com/office/drawing/2014/main" id="{066B580A-2D0F-7DDF-7D67-AAC893FAC2EF}"/>
               </a:ext>
             </a:extLst>
           </p:cNvPr>
@@ -2990,8 +3329,8 @@
         </p:blipFill>
         <p:spPr>
           <a:xfrm>
-            <a:off x="5951544" y="0"/>
-            <a:ext cx="5926667" cy="3657600"/>
+            <a:off x="0" y="178287"/>
+            <a:ext cx="5943600" cy="3668050"/>
           </a:xfrm>
           <a:prstGeom prst="rect">
             <a:avLst/>
@@ -3005,10 +3344,10 @@
       </p:pic>
       <p:pic>
         <p:nvPicPr>
-          <p:cNvPr id="8" name="Picture 7">
+          <p:cNvPr id="7" name="Picture 6">
             <a:extLst>
               <a:ext uri="{FF2B5EF4-FFF2-40B4-BE49-F238E27FC236}">
-                <a16:creationId xmlns:a16="http://schemas.microsoft.com/office/drawing/2014/main" id="{C5BBC697-7A3E-801E-C8EF-6844A00DE9C8}"/>
+                <a16:creationId xmlns:a16="http://schemas.microsoft.com/office/drawing/2014/main" id="{CC59AB7B-68A5-472F-F9C1-FA6F51BFBCE9}"/>
               </a:ext>
             </a:extLst>
           </p:cNvPr>
@@ -3017,16 +3356,15 @@
           </p:cNvPicPr>
           <p:nvPr/>
         </p:nvPicPr>
-        <p:blipFill>
+        <p:blipFill rotWithShape="1">
           <a:blip r:embed="rId3"/>
-          <a:stretch>
-            <a:fillRect/>
-          </a:stretch>
+          <a:srcRect b="81161"/>
+          <a:stretch/>
         </p:blipFill>
         <p:spPr>
           <a:xfrm>
-            <a:off x="0" y="1"/>
-            <a:ext cx="5926667" cy="3657600"/>
+            <a:off x="0" y="150577"/>
+            <a:ext cx="5943600" cy="691025"/>
           </a:xfrm>
           <a:prstGeom prst="rect">
             <a:avLst/>
@@ -3040,10 +3378,10 @@
       </p:pic>
       <p:pic>
         <p:nvPicPr>
-          <p:cNvPr id="10" name="Picture 9">
+          <p:cNvPr id="12" name="Picture 11">
             <a:extLst>
               <a:ext uri="{FF2B5EF4-FFF2-40B4-BE49-F238E27FC236}">
-                <a16:creationId xmlns:a16="http://schemas.microsoft.com/office/drawing/2014/main" id="{B709E95D-E445-C48F-FDA8-1FF1CF1AC675}"/>
+                <a16:creationId xmlns:a16="http://schemas.microsoft.com/office/drawing/2014/main" id="{CD598E66-8790-128E-2A46-1BCA5D4D6BED}"/>
               </a:ext>
             </a:extLst>
           </p:cNvPr>
@@ -3060,128 +3398,48 @@
         </p:blipFill>
         <p:spPr>
           <a:xfrm>
-            <a:off x="11895886" y="0"/>
-            <a:ext cx="5926667" cy="3657600"/>
+            <a:off x="0" y="3650252"/>
+            <a:ext cx="5943600" cy="3672296"/>
           </a:xfrm>
           <a:prstGeom prst="rect">
             <a:avLst/>
           </a:prstGeom>
-          <a:ln>
-            <a:solidFill>
-              <a:schemeClr val="tx1"/>
-            </a:solidFill>
-          </a:ln>
         </p:spPr>
       </p:pic>
-      <p:sp>
-        <p:nvSpPr>
-          <p:cNvPr id="11" name="TextBox 10">
+      <p:pic>
+        <p:nvPicPr>
+          <p:cNvPr id="15" name="Picture 14">
             <a:extLst>
               <a:ext uri="{FF2B5EF4-FFF2-40B4-BE49-F238E27FC236}">
-                <a16:creationId xmlns:a16="http://schemas.microsoft.com/office/drawing/2014/main" id="{C48FE5A6-4215-9E84-8B66-EE85D14DF3E8}"/>
+                <a16:creationId xmlns:a16="http://schemas.microsoft.com/office/drawing/2014/main" id="{08110997-21A7-FFE9-6C06-E96F5A569B4A}"/>
               </a:ext>
             </a:extLst>
           </p:cNvPr>
-          <p:cNvSpPr txBox="1"/>
+          <p:cNvPicPr>
+            <a:picLocks noChangeAspect="1"/>
+          </p:cNvPicPr>
           <p:nvPr/>
-        </p:nvSpPr>
+        </p:nvPicPr>
+        <p:blipFill>
+          <a:blip r:embed="rId5"/>
+          <a:stretch>
+            <a:fillRect/>
+          </a:stretch>
+        </p:blipFill>
         <p:spPr>
           <a:xfrm>
-            <a:off x="152400" y="127000"/>
-            <a:ext cx="546100" cy="369332"/>
+            <a:off x="0" y="7303394"/>
+            <a:ext cx="5943600" cy="3669406"/>
           </a:xfrm>
           <a:prstGeom prst="rect">
             <a:avLst/>
           </a:prstGeom>
-          <a:noFill/>
         </p:spPr>
-        <p:txBody>
-          <a:bodyPr wrap="square" rtlCol="0">
-            <a:spAutoFit/>
-          </a:bodyPr>
-          <a:lstStyle/>
-          <a:p>
-            <a:r>
-              <a:rPr lang="en-US" dirty="0"/>
-              <a:t>A)</a:t>
-            </a:r>
-          </a:p>
-        </p:txBody>
-      </p:sp>
-      <p:sp>
-        <p:nvSpPr>
-          <p:cNvPr id="12" name="TextBox 11">
-            <a:extLst>
-              <a:ext uri="{FF2B5EF4-FFF2-40B4-BE49-F238E27FC236}">
-                <a16:creationId xmlns:a16="http://schemas.microsoft.com/office/drawing/2014/main" id="{6751D001-3EE0-15AE-8DCA-43152835436A}"/>
-              </a:ext>
-            </a:extLst>
-          </p:cNvPr>
-          <p:cNvSpPr txBox="1"/>
-          <p:nvPr/>
-        </p:nvSpPr>
-        <p:spPr>
-          <a:xfrm>
-            <a:off x="6261100" y="127000"/>
-            <a:ext cx="546100" cy="369332"/>
-          </a:xfrm>
-          <a:prstGeom prst="rect">
-            <a:avLst/>
-          </a:prstGeom>
-          <a:noFill/>
-        </p:spPr>
-        <p:txBody>
-          <a:bodyPr wrap="square" rtlCol="0">
-            <a:spAutoFit/>
-          </a:bodyPr>
-          <a:lstStyle/>
-          <a:p>
-            <a:r>
-              <a:rPr lang="en-US" dirty="0"/>
-              <a:t>B)</a:t>
-            </a:r>
-          </a:p>
-        </p:txBody>
-      </p:sp>
-      <p:sp>
-        <p:nvSpPr>
-          <p:cNvPr id="13" name="TextBox 12">
-            <a:extLst>
-              <a:ext uri="{FF2B5EF4-FFF2-40B4-BE49-F238E27FC236}">
-                <a16:creationId xmlns:a16="http://schemas.microsoft.com/office/drawing/2014/main" id="{CC6B69B6-8D9A-BF4D-9A59-C50F2432116C}"/>
-              </a:ext>
-            </a:extLst>
-          </p:cNvPr>
-          <p:cNvSpPr txBox="1"/>
-          <p:nvPr/>
-        </p:nvSpPr>
-        <p:spPr>
-          <a:xfrm>
-            <a:off x="12187767" y="127000"/>
-            <a:ext cx="546100" cy="369332"/>
-          </a:xfrm>
-          <a:prstGeom prst="rect">
-            <a:avLst/>
-          </a:prstGeom>
-          <a:noFill/>
-        </p:spPr>
-        <p:txBody>
-          <a:bodyPr wrap="square" rtlCol="0">
-            <a:spAutoFit/>
-          </a:bodyPr>
-          <a:lstStyle/>
-          <a:p>
-            <a:r>
-              <a:rPr lang="en-US" dirty="0"/>
-              <a:t>C)</a:t>
-            </a:r>
-          </a:p>
-        </p:txBody>
-      </p:sp>
+      </p:pic>
     </p:spTree>
     <p:extLst>
       <p:ext uri="{BB962C8B-B14F-4D97-AF65-F5344CB8AC3E}">
-        <p14:creationId xmlns:p14="http://schemas.microsoft.com/office/powerpoint/2010/main" val="4037679570"/>
+        <p14:creationId xmlns:p14="http://schemas.microsoft.com/office/powerpoint/2010/main" val="3295186166"/>
       </p:ext>
     </p:extLst>
   </p:cSld>

</xml_diff>